<commit_message>
remove .lock error from start tutorial
</commit_message>
<xml_diff>
--- a/assets/slides/Starting a MAgPIE run.pptx
+++ b/assets/slides/Starting a MAgPIE run.pptx
@@ -6024,7 +6024,7 @@
           <a:p>
             <a:fld id="{FF82B2F4-7748-42CC-9666-B2A9A5CB98C2}" type="datetimeFigureOut">
               <a:rPr lang="en-DE" smtClean="0"/>
-              <a:t>08/04/2024</a:t>
+              <a:t>11/04/2024</a:t>
             </a:fld>
             <a:endParaRPr lang="en-DE"/>
           </a:p>
@@ -6160,7 +6160,7 @@
           <a:p>
             <a:fld id="{68F8FAD1-4573-4756-A12F-73F1310CA974}" type="datetimeFigureOut">
               <a:rPr lang="en-DE" smtClean="0"/>
-              <a:t>08/04/2024</a:t>
+              <a:t>11/04/2024</a:t>
             </a:fld>
             <a:endParaRPr lang="en-DE"/>
           </a:p>
@@ -12240,19 +12240,19 @@
               <a:t>scripts: </a:t>
             </a:r>
             <a:r>
-              <a:rPr lang="en-US" dirty="0"/>
+              <a:rPr lang="en-US" sz="1600" dirty="0"/>
               <a:t>Calibrate, </a:t>
             </a:r>
             <a:r>
-              <a:rPr lang="en-US" b="1" dirty="0"/>
+              <a:rPr lang="en-US" sz="1600" b="1" dirty="0"/>
               <a:t>start</a:t>
             </a:r>
             <a:r>
-              <a:rPr lang="en-US" dirty="0"/>
-              <a:t>, post process </a:t>
-            </a:r>
-            <a:r>
-              <a:rPr lang="en-US" dirty="0" err="1"/>
+              <a:rPr lang="en-US" sz="1600" dirty="0"/>
+              <a:t>, post processing </a:t>
+            </a:r>
+            <a:r>
+              <a:rPr lang="en-US" sz="1600" dirty="0" err="1"/>
               <a:t>MAgPIE</a:t>
             </a:r>
             <a:endParaRPr lang="en-DE" dirty="0"/>
@@ -14234,7 +14234,7 @@
             </a:r>
             <a:r>
               <a:rPr lang="en-US" sz="1400" b="1" dirty="0"/>
-              <a:t>within a terminal in the main folder of the model </a:t>
+              <a:t>within a terminal in the main magpie folder of the model </a:t>
             </a:r>
             <a:r>
               <a:rPr lang="en-US" sz="1400" b="1" dirty="0" err="1">
@@ -16509,6 +16509,36 @@
           </a:prstGeom>
         </p:spPr>
       </p:pic>
+      <p:pic>
+        <p:nvPicPr>
+          <p:cNvPr id="13" name="Picture 12">
+            <a:extLst>
+              <a:ext uri="{FF2B5EF4-FFF2-40B4-BE49-F238E27FC236}">
+                <a16:creationId xmlns:a16="http://schemas.microsoft.com/office/drawing/2014/main" id="{00097D35-7CEB-4FA7-8E01-E87B26A40444}"/>
+              </a:ext>
+            </a:extLst>
+          </p:cNvPr>
+          <p:cNvPicPr>
+            <a:picLocks noChangeAspect="1"/>
+          </p:cNvPicPr>
+          <p:nvPr/>
+        </p:nvPicPr>
+        <p:blipFill>
+          <a:blip r:embed="rId11"/>
+          <a:stretch>
+            <a:fillRect/>
+          </a:stretch>
+        </p:blipFill>
+        <p:spPr>
+          <a:xfrm>
+            <a:off x="7147687" y="3383777"/>
+            <a:ext cx="3669067" cy="3000290"/>
+          </a:xfrm>
+          <a:prstGeom prst="rect">
+            <a:avLst/>
+          </a:prstGeom>
+        </p:spPr>
+      </p:pic>
     </p:spTree>
     <p:extLst>
       <p:ext uri="{BB962C8B-B14F-4D97-AF65-F5344CB8AC3E}">
@@ -16935,6 +16965,51 @@
                       </p:childTnLst>
                     </p:cTn>
                   </p:par>
+                  <p:par>
+                    <p:cTn id="35" fill="hold">
+                      <p:stCondLst>
+                        <p:cond delay="indefinite"/>
+                      </p:stCondLst>
+                      <p:childTnLst>
+                        <p:par>
+                          <p:cTn id="36" fill="hold">
+                            <p:stCondLst>
+                              <p:cond delay="0"/>
+                            </p:stCondLst>
+                            <p:childTnLst>
+                              <p:par>
+                                <p:cTn id="37" presetID="1" presetClass="entr" presetSubtype="0" fill="hold" nodeType="clickEffect">
+                                  <p:stCondLst>
+                                    <p:cond delay="0"/>
+                                  </p:stCondLst>
+                                  <p:childTnLst>
+                                    <p:set>
+                                      <p:cBhvr>
+                                        <p:cTn id="38" dur="1" fill="hold">
+                                          <p:stCondLst>
+                                            <p:cond delay="0"/>
+                                          </p:stCondLst>
+                                        </p:cTn>
+                                        <p:tgtEl>
+                                          <p:spTgt spid="13"/>
+                                        </p:tgtEl>
+                                        <p:attrNameLst>
+                                          <p:attrName>style.visibility</p:attrName>
+                                        </p:attrNameLst>
+                                      </p:cBhvr>
+                                      <p:to>
+                                        <p:strVal val="visible"/>
+                                      </p:to>
+                                    </p:set>
+                                  </p:childTnLst>
+                                </p:cTn>
+                              </p:par>
+                            </p:childTnLst>
+                          </p:cTn>
+                        </p:par>
+                      </p:childTnLst>
+                    </p:cTn>
+                  </p:par>
                 </p:childTnLst>
               </p:cTn>
               <p:prevCondLst>
@@ -17393,16 +17468,6 @@
             </a:solidFill>
           </a:ln>
           <a:extLst>
-            <a:ext uri="{91240B29-F687-4F45-9708-019B960494DF}">
-              <a14:hiddenLine xmlns:a14="http://schemas.microsoft.com/office/drawing/2010/main" w="9525">
-                <a:solidFill>
-                  <a:schemeClr val="tx1"/>
-                </a:solidFill>
-                <a:miter lim="800000"/>
-                <a:headEnd/>
-                <a:tailEnd/>
-              </a14:hiddenLine>
-            </a:ext>
             <a:ext uri="{AF507438-7753-43E0-B8FC-AC1667EBCBE1}">
               <a14:hiddenEffects xmlns:a14="http://schemas.microsoft.com/office/drawing/2010/main">
                 <a:effectLst>
@@ -17450,7 +17515,7 @@
             </a:r>
             <a:r>
               <a:rPr lang="en-US" sz="2800" b="1" dirty="0"/>
-              <a:t>files (in the output older of your run). In case of doubts, </a:t>
+              <a:t>files (in the output folder of your run). In case of doubts, </a:t>
             </a:r>
             <a:r>
               <a:rPr lang="en-US" sz="2800" b="1" dirty="0">
@@ -17938,29 +18003,6 @@
               <a:t>.</a:t>
             </a:r>
           </a:p>
-          <a:p>
-            <a:pPr>
-              <a:buFont typeface="Arial" panose="020B0604020202020204" pitchFamily="34" charset="0"/>
-              <a:buChar char="•"/>
-            </a:pPr>
-            <a:r>
-              <a:rPr lang="en-US" sz="2800" b="1" dirty="0"/>
-              <a:t>Make sure that you </a:t>
-            </a:r>
-            <a:r>
-              <a:rPr lang="en-US" sz="2800" b="1" dirty="0">
-                <a:solidFill>
-                  <a:srgbClr val="C00000"/>
-                </a:solidFill>
-              </a:rPr>
-              <a:t>delete the .lock </a:t>
-            </a:r>
-            <a:r>
-              <a:rPr lang="en-US" sz="2800" b="1" dirty="0"/>
-              <a:t>folder, if it was not deleted automatically to unlock the model after a termination of a run.</a:t>
-            </a:r>
-            <a:endParaRPr lang="de-DE" sz="2800" b="1" dirty="0"/>
-          </a:p>
         </p:txBody>
       </p:sp>
       <p:sp>
@@ -18139,55 +18181,6 @@
                                           <p:spTgt spid="2">
                                             <p:txEl>
                                               <p:pRg st="1" end="1"/>
-                                            </p:txEl>
-                                          </p:spTgt>
-                                        </p:tgtEl>
-                                        <p:attrNameLst>
-                                          <p:attrName>style.visibility</p:attrName>
-                                        </p:attrNameLst>
-                                      </p:cBhvr>
-                                      <p:to>
-                                        <p:strVal val="visible"/>
-                                      </p:to>
-                                    </p:set>
-                                  </p:childTnLst>
-                                </p:cTn>
-                              </p:par>
-                            </p:childTnLst>
-                          </p:cTn>
-                        </p:par>
-                      </p:childTnLst>
-                    </p:cTn>
-                  </p:par>
-                  <p:par>
-                    <p:cTn id="7" fill="hold">
-                      <p:stCondLst>
-                        <p:cond delay="indefinite"/>
-                      </p:stCondLst>
-                      <p:childTnLst>
-                        <p:par>
-                          <p:cTn id="8" fill="hold">
-                            <p:stCondLst>
-                              <p:cond delay="0"/>
-                            </p:stCondLst>
-                            <p:childTnLst>
-                              <p:par>
-                                <p:cTn id="9" presetID="1" presetClass="entr" presetSubtype="0" fill="hold" nodeType="clickEffect">
-                                  <p:stCondLst>
-                                    <p:cond delay="0"/>
-                                  </p:stCondLst>
-                                  <p:childTnLst>
-                                    <p:set>
-                                      <p:cBhvr>
-                                        <p:cTn id="10" dur="1" fill="hold">
-                                          <p:stCondLst>
-                                            <p:cond delay="0"/>
-                                          </p:stCondLst>
-                                        </p:cTn>
-                                        <p:tgtEl>
-                                          <p:spTgt spid="2">
-                                            <p:txEl>
-                                              <p:pRg st="2" end="2"/>
                                             </p:txEl>
                                           </p:spTgt>
                                         </p:tgtEl>

</xml_diff>